<commit_message>
Updated Azure HPC module
</commit_message>
<xml_diff>
--- a/Big Data and Analytics/Azure HPC/Session 1 - Introduction and Slides/Azure HPC.pptx
+++ b/Big Data and Analytics/Azure HPC/Session 1 - Introduction and Slides/Azure HPC.pptx
@@ -6,18 +6,20 @@
     <p:sldMasterId id="2147483663" r:id="rId2"/>
   </p:sldMasterIdLst>
   <p:notesMasterIdLst>
-    <p:notesMasterId r:id="rId12"/>
+    <p:notesMasterId r:id="rId14"/>
   </p:notesMasterIdLst>
   <p:sldIdLst>
     <p:sldId id="256" r:id="rId3"/>
-    <p:sldId id="301" r:id="rId4"/>
-    <p:sldId id="307" r:id="rId5"/>
-    <p:sldId id="308" r:id="rId6"/>
-    <p:sldId id="303" r:id="rId7"/>
-    <p:sldId id="304" r:id="rId8"/>
-    <p:sldId id="305" r:id="rId9"/>
-    <p:sldId id="306" r:id="rId10"/>
-    <p:sldId id="299" r:id="rId11"/>
+    <p:sldId id="309" r:id="rId4"/>
+    <p:sldId id="310" r:id="rId5"/>
+    <p:sldId id="301" r:id="rId6"/>
+    <p:sldId id="307" r:id="rId7"/>
+    <p:sldId id="308" r:id="rId8"/>
+    <p:sldId id="303" r:id="rId9"/>
+    <p:sldId id="304" r:id="rId10"/>
+    <p:sldId id="305" r:id="rId11"/>
+    <p:sldId id="306" r:id="rId12"/>
+    <p:sldId id="299" r:id="rId13"/>
   </p:sldIdLst>
   <p:sldSz cx="12192000" cy="6858000"/>
   <p:notesSz cx="6858000" cy="9144000"/>
@@ -206,7 +208,7 @@
           <a:p>
             <a:fld id="{49B60EF2-7028-489F-85D8-FE86CD7CF2A0}" type="datetimeFigureOut">
               <a:rPr lang="en-US" smtClean="0"/>
-              <a:t>10/10/2016</a:t>
+              <a:t>12/20/2016</a:t>
             </a:fld>
             <a:endParaRPr lang="en-US"/>
           </a:p>
@@ -557,6 +559,110 @@
 </p:notes>
 </file>
 
+<file path=ppt/notesSlides/notesSlide10.xml><?xml version="1.0" encoding="utf-8"?>
+<p:notes xmlns:a="http://schemas.openxmlformats.org/drawingml/2006/main" xmlns:r="http://schemas.openxmlformats.org/officeDocument/2006/relationships" xmlns:p="http://schemas.openxmlformats.org/presentationml/2006/main">
+  <p:cSld>
+    <p:spTree>
+      <p:nvGrpSpPr>
+        <p:cNvPr id="1" name=""/>
+        <p:cNvGrpSpPr/>
+        <p:nvPr/>
+      </p:nvGrpSpPr>
+      <p:grpSpPr>
+        <a:xfrm>
+          <a:off x="0" y="0"/>
+          <a:ext cx="0" cy="0"/>
+          <a:chOff x="0" y="0"/>
+          <a:chExt cx="0" cy="0"/>
+        </a:xfrm>
+      </p:grpSpPr>
+      <p:sp>
+        <p:nvSpPr>
+          <p:cNvPr id="2" name="Slide Image Placeholder 1"/>
+          <p:cNvSpPr>
+            <a:spLocks noGrp="1" noRot="1" noChangeAspect="1"/>
+          </p:cNvSpPr>
+          <p:nvPr>
+            <p:ph type="sldImg"/>
+          </p:nvPr>
+        </p:nvSpPr>
+        <p:spPr/>
+      </p:sp>
+      <p:sp>
+        <p:nvSpPr>
+          <p:cNvPr id="3" name="Notes Placeholder 2"/>
+          <p:cNvSpPr>
+            <a:spLocks noGrp="1"/>
+          </p:cNvSpPr>
+          <p:nvPr>
+            <p:ph type="body" idx="1"/>
+          </p:nvPr>
+        </p:nvSpPr>
+        <p:spPr/>
+        <p:txBody>
+          <a:bodyPr/>
+          <a:lstStyle/>
+          <a:p>
+            <a:pPr marL="0" marR="0" indent="0" algn="l" defTabSz="914400" rtl="0" eaLnBrk="1" fontAlgn="auto" latinLnBrk="0" hangingPunct="1">
+              <a:lnSpc>
+                <a:spcPct val="100000"/>
+              </a:lnSpc>
+              <a:spcBef>
+                <a:spcPts val="0"/>
+              </a:spcBef>
+              <a:spcAft>
+                <a:spcPts val="0"/>
+              </a:spcAft>
+              <a:buClrTx/>
+              <a:buSzTx/>
+              <a:buFontTx/>
+              <a:buNone/>
+              <a:tabLst/>
+              <a:defRPr/>
+            </a:pPr>
+            <a:r>
+              <a:rPr lang="en-US" dirty="0" smtClean="0"/>
+              <a:t>The Simple Linux Utility for Resource Management (SLURM), also known as the SLURM Workload Manager, is a free and open-source job scheduler for Linux that excels at distributing heavy computing workloads across clusters of machines and processors. It is used on more than half of the world's largest supercomputers and High-Performance Computing (HPC) clusters, and it enjoys widespread use in the research community for jobs that require significant CPU resources.</a:t>
+            </a:r>
+          </a:p>
+        </p:txBody>
+      </p:sp>
+      <p:sp>
+        <p:nvSpPr>
+          <p:cNvPr id="4" name="Slide Number Placeholder 3"/>
+          <p:cNvSpPr>
+            <a:spLocks noGrp="1"/>
+          </p:cNvSpPr>
+          <p:nvPr>
+            <p:ph type="sldNum" sz="quarter" idx="10"/>
+          </p:nvPr>
+        </p:nvSpPr>
+        <p:spPr/>
+        <p:txBody>
+          <a:bodyPr/>
+          <a:lstStyle/>
+          <a:p>
+            <a:fld id="{01283FAC-A721-45A3-BBDE-EAF2B09B7CD9}" type="slidenum">
+              <a:rPr lang="en-US" smtClean="0"/>
+              <a:t>10</a:t>
+            </a:fld>
+            <a:endParaRPr lang="en-US"/>
+          </a:p>
+        </p:txBody>
+      </p:sp>
+    </p:spTree>
+    <p:extLst>
+      <p:ext uri="{BB962C8B-B14F-4D97-AF65-F5344CB8AC3E}">
+        <p14:creationId xmlns:p14="http://schemas.microsoft.com/office/powerpoint/2010/main" val="2236143850"/>
+      </p:ext>
+    </p:extLst>
+  </p:cSld>
+  <p:clrMapOvr>
+    <a:masterClrMapping/>
+  </p:clrMapOvr>
+</p:notes>
+</file>
+
 <file path=ppt/notesSlides/notesSlide2.xml><?xml version="1.0" encoding="utf-8"?>
 <p:notes xmlns:a="http://schemas.openxmlformats.org/drawingml/2006/main" xmlns:r="http://schemas.openxmlformats.org/officeDocument/2006/relationships" xmlns:p="http://schemas.openxmlformats.org/presentationml/2006/main">
   <p:cSld>
@@ -601,46 +707,32 @@
           <a:bodyPr/>
           <a:lstStyle/>
           <a:p>
-            <a:r>
-              <a:rPr lang="en-US" sz="1200" kern="1200" dirty="0" smtClean="0">
-                <a:solidFill>
-                  <a:schemeClr val="tx1"/>
-                </a:solidFill>
-                <a:effectLst/>
-                <a:latin typeface="+mn-lt"/>
-                <a:ea typeface="+mn-ea"/>
-                <a:cs typeface="+mn-cs"/>
-              </a:rPr>
-              <a:t>With Azure, you deploy a cluster of VMs to the cloud in minutes and scale it up and down as needed. They can be Windows VMs or Linux VMs; Azure doesn’t care. In fact, Linux VMs are slightly less expensive because you don’t pay Windows licensing fees for them. You can also choose from a variety of virtual-machine sizes, and you can use deployment templates – something I’ll say more about shortly – to automate your deployments.</a:t>
-            </a:r>
-          </a:p>
-          <a:p>
-            <a:r>
-              <a:rPr lang="en-US" sz="1200" kern="1200" dirty="0" smtClean="0">
-                <a:solidFill>
-                  <a:schemeClr val="tx1"/>
-                </a:solidFill>
-                <a:effectLst/>
-                <a:latin typeface="+mn-lt"/>
-                <a:ea typeface="+mn-ea"/>
-                <a:cs typeface="+mn-cs"/>
-              </a:rPr>
-              <a:t> </a:t>
-            </a:r>
-          </a:p>
-          <a:p>
-            <a:r>
-              <a:rPr lang="en-US" sz="1200" kern="1200" dirty="0" smtClean="0">
-                <a:solidFill>
-                  <a:schemeClr val="tx1"/>
-                </a:solidFill>
-                <a:effectLst/>
-                <a:latin typeface="+mn-lt"/>
-                <a:ea typeface="+mn-ea"/>
-                <a:cs typeface="+mn-cs"/>
-              </a:rPr>
-              <a:t>Azure Batch can also play a role in HPC by allowing you to schedule jobs to run across a pool of VMs, much like the batch-processing services frequently used on mainframes and supercomputers.</a:t>
-            </a:r>
+            <a:pPr marL="0" marR="0" lvl="0" indent="0" algn="l" defTabSz="914400" rtl="0" eaLnBrk="1" fontAlgn="auto" latinLnBrk="0" hangingPunct="1">
+              <a:lnSpc>
+                <a:spcPct val="100000"/>
+              </a:lnSpc>
+              <a:spcBef>
+                <a:spcPts val="0"/>
+              </a:spcBef>
+              <a:spcAft>
+                <a:spcPts val="0"/>
+              </a:spcAft>
+              <a:buClrTx/>
+              <a:buSzTx/>
+              <a:buFontTx/>
+              <a:buNone/>
+              <a:tabLst/>
+              <a:defRPr/>
+            </a:pPr>
+            <a:r>
+              <a:rPr lang="en-US" dirty="0" smtClean="0"/>
+              <a:t>High-performance computing (HPC)</a:t>
+            </a:r>
+            <a:r>
+              <a:rPr lang="en-US" baseline="0" dirty="0" smtClean="0"/>
+              <a:t> typically refers to computing power beyond that of a typical desktop computer. Obviously, the definition of high-performance changes with time as more computing power is crammed into smaller spaces, making the supercomputers of today commodity computers of tomorrow. Regardless though, the concepts of HPC have remained the same since the early days of computing wherein scientists and engineers worked to figure out how aggregate more computing resources to perform computing tasks.</a:t>
+            </a:r>
+            <a:endParaRPr lang="en-US" dirty="0" smtClean="0"/>
           </a:p>
         </p:txBody>
       </p:sp>
@@ -670,7 +762,7 @@
     </p:spTree>
     <p:extLst>
       <p:ext uri="{BB962C8B-B14F-4D97-AF65-F5344CB8AC3E}">
-        <p14:creationId xmlns:p14="http://schemas.microsoft.com/office/powerpoint/2010/main" val="15451850"/>
+        <p14:creationId xmlns:p14="http://schemas.microsoft.com/office/powerpoint/2010/main" val="2920671262"/>
       </p:ext>
     </p:extLst>
   </p:cSld>
@@ -724,67 +816,30 @@
           <a:bodyPr/>
           <a:lstStyle/>
           <a:p>
-            <a:r>
-              <a:rPr lang="en-US" sz="1200" kern="1200" dirty="0" smtClean="0">
-                <a:solidFill>
-                  <a:schemeClr val="tx1"/>
-                </a:solidFill>
-                <a:effectLst/>
-                <a:latin typeface="+mn-lt"/>
-                <a:ea typeface="+mn-ea"/>
-                <a:cs typeface="+mn-cs"/>
-              </a:rPr>
-              <a:t>Azure offers a variety of VM sizes in an effort to make sure there’s something to fit everyone’s needs. Each size is identified by a letter and a number: A0, D1, G2, and so on. There is documentation online detailing the specs for each machine – number of cores, amount of RAM, type and size of hard disk, for example – as well as the cost. Not surprisingly, more powerful machines are most costly as well. Prices range from as little as 7 cents an hour for a single core machine running Linux to almost $10 an hour for a machine with 32 cores and almost half a terabyte of RAM. The G-series machines are reserved for the most power-hungry applications.</a:t>
-            </a:r>
-          </a:p>
-          <a:p>
-            <a:r>
-              <a:rPr lang="en-US" sz="1200" kern="1200" dirty="0" smtClean="0">
-                <a:solidFill>
-                  <a:schemeClr val="tx1"/>
-                </a:solidFill>
-                <a:effectLst/>
-                <a:latin typeface="+mn-lt"/>
-                <a:ea typeface="+mn-ea"/>
-                <a:cs typeface="+mn-cs"/>
-              </a:rPr>
-              <a:t> </a:t>
-            </a:r>
-          </a:p>
-          <a:p>
-            <a:r>
-              <a:rPr lang="en-US" sz="1200" kern="1200" dirty="0" smtClean="0">
-                <a:solidFill>
-                  <a:schemeClr val="tx1"/>
-                </a:solidFill>
-                <a:effectLst/>
-                <a:latin typeface="+mn-lt"/>
-                <a:ea typeface="+mn-ea"/>
-                <a:cs typeface="+mn-cs"/>
-              </a:rPr>
-              <a:t>Costs can grow astronomically when you talk about clusters with hundreds or even thousands of cores. But cost isn’t really the point. The point is having massive amounts of computing power at your fingertips. Besides, the cost of “renting” even the largest virtual cluster pales in comparison to the cost of purchasing, setting up, and maintaining a similarly sized cluster of your own.</a:t>
-            </a:r>
-          </a:p>
-          <a:p>
-            <a:endParaRPr lang="en-US" dirty="0" smtClean="0"/>
-          </a:p>
-          <a:p>
+            <a:pPr marL="0" marR="0" lvl="0" indent="0" algn="l" defTabSz="914400" rtl="0" eaLnBrk="1" fontAlgn="auto" latinLnBrk="0" hangingPunct="1">
+              <a:lnSpc>
+                <a:spcPct val="100000"/>
+              </a:lnSpc>
+              <a:spcBef>
+                <a:spcPts val="0"/>
+              </a:spcBef>
+              <a:spcAft>
+                <a:spcPts val="0"/>
+              </a:spcAft>
+              <a:buClrTx/>
+              <a:buSzTx/>
+              <a:buFontTx/>
+              <a:buNone/>
+              <a:tabLst/>
+              <a:defRPr/>
+            </a:pPr>
             <a:r>
               <a:rPr lang="en-US" dirty="0" smtClean="0"/>
-              <a:t>Not all VM sizes are available in all data centers. For the latest pricing information and availability, see https://azure.microsoft.com/en-us/pricing/details/virtual-machines.</a:t>
-            </a:r>
-          </a:p>
-          <a:p>
-            <a:endParaRPr lang="en-US" dirty="0" smtClean="0"/>
-          </a:p>
-          <a:p>
-            <a:r>
-              <a:rPr lang="en-US" dirty="0" smtClean="0"/>
-              <a:t>N-series VMs are currently in preview</a:t>
+              <a:t>High</a:t>
             </a:r>
             <a:r>
               <a:rPr lang="en-US" baseline="0" dirty="0" smtClean="0"/>
-              <a:t> and are an answer to researchers who need GPU power to perform complex calculations. They are equipped with NVIDIA Tesla GPUs.</a:t>
+              <a:t>-performance computing is typically performed on a cluster of computers interconnected by a high-speed network. Workloads are sent to a master node which delegates tasks to the worker nodes. Historically, clusters were built using proprietary, often purpose-built computers. Recent trends though have shifted to using commodity hardware – the same kind of components used to build desktop computers – to construct HPC clusters. Engineers are getting even more clever with how they build clusters, too. The latest trend in HPC has been to use GPUs in addition to CPUs to created HPC clusters. While a typical desktop CPU has 2, 4, or 8 cores, graphics cards have usually hundreds of cores. These cores, while not as powerful as CPU cores, can still perform computations. HPC clusters are combining CPUs and GPUs to squeeze even more performance out of computer hardware for heavy workloads.</a:t>
             </a:r>
             <a:endParaRPr lang="en-US" dirty="0" smtClean="0"/>
           </a:p>
@@ -816,7 +871,7 @@
     </p:spTree>
     <p:extLst>
       <p:ext uri="{BB962C8B-B14F-4D97-AF65-F5344CB8AC3E}">
-        <p14:creationId xmlns:p14="http://schemas.microsoft.com/office/powerpoint/2010/main" val="3163571352"/>
+        <p14:creationId xmlns:p14="http://schemas.microsoft.com/office/powerpoint/2010/main" val="2593675104"/>
       </p:ext>
     </p:extLst>
   </p:cSld>
@@ -870,30 +925,45 @@
           <a:bodyPr/>
           <a:lstStyle/>
           <a:p>
-            <a:pPr marL="0" marR="0" lvl="0" indent="0" algn="l" defTabSz="914400" rtl="0" eaLnBrk="1" fontAlgn="auto" latinLnBrk="0" hangingPunct="1">
-              <a:lnSpc>
-                <a:spcPct val="100000"/>
-              </a:lnSpc>
-              <a:spcBef>
-                <a:spcPts val="0"/>
-              </a:spcBef>
-              <a:spcAft>
-                <a:spcPts val="0"/>
-              </a:spcAft>
-              <a:buClrTx/>
-              <a:buSzTx/>
-              <a:buFontTx/>
-              <a:buNone/>
-              <a:tabLst/>
-              <a:defRPr/>
-            </a:pPr>
-            <a:r>
-              <a:rPr lang="en-US" dirty="0" smtClean="0"/>
-              <a:t>For background,</a:t>
-            </a:r>
-            <a:r>
-              <a:rPr lang="en-US" baseline="0" dirty="0" smtClean="0"/>
-              <a:t> see https://blogs.msdn.microsoft.com/uk_faculty_connection/2016/09/12/choosing-the-most-appropiate-azure-virtual-machine-specification/?wt.mc_id=DX_873849. Not shown here are H machines, which are optimized for extremely heavy computing workloads.</a:t>
+            <a:r>
+              <a:rPr lang="en-US" sz="1200" kern="1200" dirty="0" smtClean="0">
+                <a:solidFill>
+                  <a:schemeClr val="tx1"/>
+                </a:solidFill>
+                <a:effectLst/>
+                <a:latin typeface="+mn-lt"/>
+                <a:ea typeface="+mn-ea"/>
+                <a:cs typeface="+mn-cs"/>
+              </a:rPr>
+              <a:t>With Azure, you deploy a cluster of VMs to the cloud in minutes and scale it up and down as needed. They can be Windows VMs or Linux VMs; Azure doesn’t care. In fact, Linux VMs are slightly less expensive because you don’t pay Windows licensing fees for them. You can also choose from a variety of virtual-machine sizes, and you can use deployment templates – something I’ll say more about shortly – to automate your deployments.</a:t>
+            </a:r>
+          </a:p>
+          <a:p>
+            <a:r>
+              <a:rPr lang="en-US" sz="1200" kern="1200" dirty="0" smtClean="0">
+                <a:solidFill>
+                  <a:schemeClr val="tx1"/>
+                </a:solidFill>
+                <a:effectLst/>
+                <a:latin typeface="+mn-lt"/>
+                <a:ea typeface="+mn-ea"/>
+                <a:cs typeface="+mn-cs"/>
+              </a:rPr>
+              <a:t> </a:t>
+            </a:r>
+          </a:p>
+          <a:p>
+            <a:r>
+              <a:rPr lang="en-US" sz="1200" kern="1200" dirty="0" smtClean="0">
+                <a:solidFill>
+                  <a:schemeClr val="tx1"/>
+                </a:solidFill>
+                <a:effectLst/>
+                <a:latin typeface="+mn-lt"/>
+                <a:ea typeface="+mn-ea"/>
+                <a:cs typeface="+mn-cs"/>
+              </a:rPr>
+              <a:t>Azure Batch can also play a role in HPC by allowing you to schedule jobs to run across a pool of VMs, much like the batch-processing services frequently used on mainframes and supercomputers.</a:t>
             </a:r>
           </a:p>
         </p:txBody>
@@ -924,7 +994,7 @@
     </p:spTree>
     <p:extLst>
       <p:ext uri="{BB962C8B-B14F-4D97-AF65-F5344CB8AC3E}">
-        <p14:creationId xmlns:p14="http://schemas.microsoft.com/office/powerpoint/2010/main" val="1935622843"/>
+        <p14:creationId xmlns:p14="http://schemas.microsoft.com/office/powerpoint/2010/main" val="15451850"/>
       </p:ext>
     </p:extLst>
   </p:cSld>
@@ -978,23 +1048,6 @@
           <a:bodyPr/>
           <a:lstStyle/>
           <a:p>
-            <a:pPr marL="0" marR="0" indent="0" algn="l" defTabSz="914400" rtl="0" eaLnBrk="1" fontAlgn="auto" latinLnBrk="0" hangingPunct="1">
-              <a:lnSpc>
-                <a:spcPct val="100000"/>
-              </a:lnSpc>
-              <a:spcBef>
-                <a:spcPts val="0"/>
-              </a:spcBef>
-              <a:spcAft>
-                <a:spcPts val="0"/>
-              </a:spcAft>
-              <a:buClrTx/>
-              <a:buSzTx/>
-              <a:buFontTx/>
-              <a:buNone/>
-              <a:tabLst/>
-              <a:defRPr/>
-            </a:pPr>
             <a:r>
               <a:rPr lang="en-US" sz="1200" kern="1200" dirty="0" smtClean="0">
                 <a:solidFill>
@@ -1005,7 +1058,57 @@
                 <a:ea typeface="+mn-ea"/>
                 <a:cs typeface="+mn-cs"/>
               </a:rPr>
-              <a:t>Here’s a quick look at three of the Azure VM sizes so you can see how they differ in cost and capability. One thing to keep in mind when deploying VMs is that you get charged for them whether they’re in use or not. When you’re finished using a VM or a cluster of VMs, it behooves you to go into the Azure portal and suspend each VM to avoid unnecessary charges. Once suspended, a VM is easily restarted so you can pick up where you left off and continue using it. I’ll show you how to start and stop VMs in the demo coming up shortly. I’ll also show you how to delete them so you can avoid even incurring storage charges for VMs that are no longer needed.</a:t>
+              <a:t>Azure offers a variety of VM sizes in an effort to make sure there’s something to fit everyone’s needs. Each size is identified by a letter and a number: A0, D1, G2, and so on. There is documentation online detailing the specs for each machine – number of cores, amount of RAM, type and size of hard disk, for example – as well as the cost. Not surprisingly, more powerful machines are most costly as well. Prices range from as little as 7 cents an hour for a single core machine running Linux to almost $10 an hour for a machine with 32 cores and almost half a terabyte of RAM. The G-series machines are reserved for the most power-hungry applications.</a:t>
+            </a:r>
+          </a:p>
+          <a:p>
+            <a:r>
+              <a:rPr lang="en-US" sz="1200" kern="1200" dirty="0" smtClean="0">
+                <a:solidFill>
+                  <a:schemeClr val="tx1"/>
+                </a:solidFill>
+                <a:effectLst/>
+                <a:latin typeface="+mn-lt"/>
+                <a:ea typeface="+mn-ea"/>
+                <a:cs typeface="+mn-cs"/>
+              </a:rPr>
+              <a:t> </a:t>
+            </a:r>
+          </a:p>
+          <a:p>
+            <a:r>
+              <a:rPr lang="en-US" sz="1200" kern="1200" dirty="0" smtClean="0">
+                <a:solidFill>
+                  <a:schemeClr val="tx1"/>
+                </a:solidFill>
+                <a:effectLst/>
+                <a:latin typeface="+mn-lt"/>
+                <a:ea typeface="+mn-ea"/>
+                <a:cs typeface="+mn-cs"/>
+              </a:rPr>
+              <a:t>Costs can grow astronomically when you talk about clusters with hundreds or even thousands of cores. But cost isn’t really the point. The point is having massive amounts of computing power at your fingertips. Besides, the cost of “renting” even the largest virtual cluster pales in comparison to the cost of purchasing, setting up, and maintaining a similarly sized cluster of your own.</a:t>
+            </a:r>
+          </a:p>
+          <a:p>
+            <a:endParaRPr lang="en-US" dirty="0" smtClean="0"/>
+          </a:p>
+          <a:p>
+            <a:r>
+              <a:rPr lang="en-US" dirty="0" smtClean="0"/>
+              <a:t>Not all VM sizes are available in all data centers. For the latest pricing information and availability, see https://azure.microsoft.com/en-us/pricing/details/virtual-machines.</a:t>
+            </a:r>
+          </a:p>
+          <a:p>
+            <a:endParaRPr lang="en-US" dirty="0" smtClean="0"/>
+          </a:p>
+          <a:p>
+            <a:r>
+              <a:rPr lang="en-US" dirty="0" smtClean="0"/>
+              <a:t>N-series VMs are currently in preview</a:t>
+            </a:r>
+            <a:r>
+              <a:rPr lang="en-US" baseline="0" dirty="0" smtClean="0"/>
+              <a:t> and are an answer to researchers who need GPU power to perform complex calculations. They are equipped with NVIDIA Tesla GPUs.</a:t>
             </a:r>
             <a:endParaRPr lang="en-US" dirty="0" smtClean="0"/>
           </a:p>
@@ -1037,7 +1140,7 @@
     </p:spTree>
     <p:extLst>
       <p:ext uri="{BB962C8B-B14F-4D97-AF65-F5344CB8AC3E}">
-        <p14:creationId xmlns:p14="http://schemas.microsoft.com/office/powerpoint/2010/main" val="3473641149"/>
+        <p14:creationId xmlns:p14="http://schemas.microsoft.com/office/powerpoint/2010/main" val="3163571352"/>
       </p:ext>
     </p:extLst>
   </p:cSld>
@@ -1091,123 +1194,31 @@
           <a:bodyPr/>
           <a:lstStyle/>
           <a:p>
-            <a:r>
-              <a:rPr lang="en-US" sz="1200" kern="1200" dirty="0" smtClean="0">
-                <a:solidFill>
-                  <a:schemeClr val="tx1"/>
-                </a:solidFill>
-                <a:effectLst/>
-                <a:latin typeface="+mn-lt"/>
-                <a:ea typeface="+mn-ea"/>
-                <a:cs typeface="+mn-cs"/>
-              </a:rPr>
-              <a:t>An important element of HPC in Azure is the Azure Resource Manager. The Azure Resource Manager is a relatively recent addition to Azure. It lets you combine the resources that comprise an application – resources such as VMs, databases, virtual networks, and storage accounts – into </a:t>
-            </a:r>
-            <a:r>
-              <a:rPr lang="en-US" sz="1200" i="1" kern="1200" dirty="0" smtClean="0">
-                <a:solidFill>
-                  <a:schemeClr val="tx1"/>
-                </a:solidFill>
-                <a:effectLst/>
-                <a:latin typeface="+mn-lt"/>
-                <a:ea typeface="+mn-ea"/>
-                <a:cs typeface="+mn-cs"/>
-              </a:rPr>
-              <a:t>resource groups</a:t>
-            </a:r>
-            <a:r>
-              <a:rPr lang="en-US" sz="1200" kern="1200" dirty="0" smtClean="0">
-                <a:solidFill>
-                  <a:schemeClr val="tx1"/>
-                </a:solidFill>
-                <a:effectLst/>
-                <a:latin typeface="+mn-lt"/>
-                <a:ea typeface="+mn-ea"/>
-                <a:cs typeface="+mn-cs"/>
-              </a:rPr>
-              <a:t> so entire applications can be deployed, managed, and even deleted with a single step. Prior to Resource Manager, resources had to be created (and deleted) one by one, which quickly became onerous with large deployments.</a:t>
-            </a:r>
-          </a:p>
-          <a:p>
-            <a:r>
-              <a:rPr lang="en-US" sz="1200" kern="1200" dirty="0" smtClean="0">
-                <a:solidFill>
-                  <a:schemeClr val="tx1"/>
-                </a:solidFill>
-                <a:effectLst/>
-                <a:latin typeface="+mn-lt"/>
-                <a:ea typeface="+mn-ea"/>
-                <a:cs typeface="+mn-cs"/>
-              </a:rPr>
-              <a:t> </a:t>
-            </a:r>
-          </a:p>
-          <a:p>
-            <a:r>
-              <a:rPr lang="en-US" sz="1200" kern="1200" dirty="0" smtClean="0">
-                <a:solidFill>
-                  <a:schemeClr val="tx1"/>
-                </a:solidFill>
-                <a:effectLst/>
-                <a:latin typeface="+mn-lt"/>
-                <a:ea typeface="+mn-ea"/>
-                <a:cs typeface="+mn-cs"/>
-              </a:rPr>
-              <a:t>The Azure Resource Manager allows you to deploy applications using declarative templates called </a:t>
-            </a:r>
-            <a:r>
-              <a:rPr lang="en-US" sz="1200" i="1" kern="1200" dirty="0" smtClean="0">
-                <a:solidFill>
-                  <a:schemeClr val="tx1"/>
-                </a:solidFill>
-                <a:effectLst/>
-                <a:latin typeface="+mn-lt"/>
-                <a:ea typeface="+mn-ea"/>
-                <a:cs typeface="+mn-cs"/>
-              </a:rPr>
-              <a:t>deployment templates</a:t>
-            </a:r>
-            <a:r>
-              <a:rPr lang="en-US" sz="1200" kern="1200" dirty="0" smtClean="0">
-                <a:solidFill>
-                  <a:schemeClr val="tx1"/>
-                </a:solidFill>
-                <a:effectLst/>
-                <a:latin typeface="+mn-lt"/>
-                <a:ea typeface="+mn-ea"/>
-                <a:cs typeface="+mn-cs"/>
-              </a:rPr>
-              <a:t>. A template contains a complete description of all the resources that make up the application. Templates can include parameters that users will be prompted to fill in each time an application is deployed. Templates can also run scripts to initialize resources to a known and consistent state.</a:t>
-            </a:r>
-          </a:p>
-          <a:p>
-            <a:r>
-              <a:rPr lang="en-US" sz="1200" kern="1200" dirty="0" smtClean="0">
-                <a:solidFill>
-                  <a:schemeClr val="tx1"/>
-                </a:solidFill>
-                <a:effectLst/>
-                <a:latin typeface="+mn-lt"/>
-                <a:ea typeface="+mn-ea"/>
-                <a:cs typeface="+mn-cs"/>
-              </a:rPr>
-              <a:t> </a:t>
-            </a:r>
-          </a:p>
-          <a:p>
-            <a:r>
-              <a:rPr lang="en-US" sz="1200" kern="1200" dirty="0" smtClean="0">
-                <a:solidFill>
-                  <a:schemeClr val="tx1"/>
-                </a:solidFill>
-                <a:effectLst/>
-                <a:latin typeface="+mn-lt"/>
-                <a:ea typeface="+mn-ea"/>
-                <a:cs typeface="+mn-cs"/>
-              </a:rPr>
-              <a:t>As an example, suppose you have built an HPC cluster that includes virtual machines and other Azure resources. With a template, you can script the creation of the entire cluster and optionally the data that goes with it. This makes it easy for others to spin up instances of the cluster, or for you to recreate it if you deleted it thinking you wouldn’t be needing it again.</a:t>
-            </a:r>
-            <a:endParaRPr lang="en-US" dirty="0" smtClean="0"/>
+            <a:pPr marL="0" marR="0" lvl="0" indent="0" algn="l" defTabSz="914400" rtl="0" eaLnBrk="1" fontAlgn="auto" latinLnBrk="0" hangingPunct="1">
+              <a:lnSpc>
+                <a:spcPct val="100000"/>
+              </a:lnSpc>
+              <a:spcBef>
+                <a:spcPts val="0"/>
+              </a:spcBef>
+              <a:spcAft>
+                <a:spcPts val="0"/>
+              </a:spcAft>
+              <a:buClrTx/>
+              <a:buSzTx/>
+              <a:buFontTx/>
+              <a:buNone/>
+              <a:tabLst/>
+              <a:defRPr/>
+            </a:pPr>
+            <a:r>
+              <a:rPr lang="en-US" dirty="0" smtClean="0"/>
+              <a:t>For background,</a:t>
+            </a:r>
+            <a:r>
+              <a:rPr lang="en-US" baseline="0" dirty="0" smtClean="0"/>
+              <a:t> see https://blogs.msdn.microsoft.com/uk_faculty_connection/2016/09/12/choosing-the-most-appropiate-azure-virtual-machine-specification/?wt.mc_id=DX_873849. Not shown here are H machines, which are optimized for extremely heavy computing workloads.</a:t>
+            </a:r>
           </a:p>
         </p:txBody>
       </p:sp>
@@ -1237,7 +1248,7 @@
     </p:spTree>
     <p:extLst>
       <p:ext uri="{BB962C8B-B14F-4D97-AF65-F5344CB8AC3E}">
-        <p14:creationId xmlns:p14="http://schemas.microsoft.com/office/powerpoint/2010/main" val="988917755"/>
+        <p14:creationId xmlns:p14="http://schemas.microsoft.com/office/powerpoint/2010/main" val="1935622843"/>
       </p:ext>
     </p:extLst>
   </p:cSld>
@@ -1291,6 +1302,23 @@
           <a:bodyPr/>
           <a:lstStyle/>
           <a:p>
+            <a:pPr marL="0" marR="0" indent="0" algn="l" defTabSz="914400" rtl="0" eaLnBrk="1" fontAlgn="auto" latinLnBrk="0" hangingPunct="1">
+              <a:lnSpc>
+                <a:spcPct val="100000"/>
+              </a:lnSpc>
+              <a:spcBef>
+                <a:spcPts val="0"/>
+              </a:spcBef>
+              <a:spcAft>
+                <a:spcPts val="0"/>
+              </a:spcAft>
+              <a:buClrTx/>
+              <a:buSzTx/>
+              <a:buFontTx/>
+              <a:buNone/>
+              <a:tabLst/>
+              <a:defRPr/>
+            </a:pPr>
             <a:r>
               <a:rPr lang="en-US" sz="1200" kern="1200" dirty="0" smtClean="0">
                 <a:solidFill>
@@ -1301,93 +1329,9 @@
                 <a:ea typeface="+mn-ea"/>
                 <a:cs typeface="+mn-cs"/>
               </a:rPr>
-              <a:t>You can build deployment templates of your own, or you can use ones that have already been built. An assortment of templates built by the Azure team and by others in the community can be found on the Azure </a:t>
-            </a:r>
-            <a:r>
-              <a:rPr lang="en-US" sz="1200" kern="1200" dirty="0" err="1" smtClean="0">
-                <a:solidFill>
-                  <a:schemeClr val="tx1"/>
-                </a:solidFill>
-                <a:effectLst/>
-                <a:latin typeface="+mn-lt"/>
-                <a:ea typeface="+mn-ea"/>
-                <a:cs typeface="+mn-cs"/>
-              </a:rPr>
-              <a:t>Quickstart</a:t>
-            </a:r>
-            <a:r>
-              <a:rPr lang="en-US" sz="1200" kern="1200" dirty="0" smtClean="0">
-                <a:solidFill>
-                  <a:schemeClr val="tx1"/>
-                </a:solidFill>
-                <a:effectLst/>
-                <a:latin typeface="+mn-lt"/>
-                <a:ea typeface="+mn-ea"/>
-                <a:cs typeface="+mn-cs"/>
-              </a:rPr>
-              <a:t> Templates Web site or on GitHub. There are templates for creating clusters of Linux VMs, deploying </a:t>
-            </a:r>
-            <a:r>
-              <a:rPr lang="en-US" sz="1200" kern="1200" dirty="0" err="1" smtClean="0">
-                <a:solidFill>
-                  <a:schemeClr val="tx1"/>
-                </a:solidFill>
-                <a:effectLst/>
-                <a:latin typeface="+mn-lt"/>
-                <a:ea typeface="+mn-ea"/>
-                <a:cs typeface="+mn-cs"/>
-              </a:rPr>
-              <a:t>Redis</a:t>
-            </a:r>
-            <a:r>
-              <a:rPr lang="en-US" sz="1200" kern="1200" dirty="0" smtClean="0">
-                <a:solidFill>
-                  <a:schemeClr val="tx1"/>
-                </a:solidFill>
-                <a:effectLst/>
-                <a:latin typeface="+mn-lt"/>
-                <a:ea typeface="+mn-ea"/>
-                <a:cs typeface="+mn-cs"/>
-              </a:rPr>
-              <a:t> clusters of Ubuntu VMs, deploying MySQL servers, creating Windows VMs provisioned with IIS, and a whole lot more. There is even a template that deploys Minecraft Server in an Ubuntu VM.</a:t>
-            </a:r>
-          </a:p>
-          <a:p>
-            <a:r>
-              <a:rPr lang="en-US" sz="1200" kern="1200" dirty="0" smtClean="0">
-                <a:solidFill>
-                  <a:schemeClr val="tx1"/>
-                </a:solidFill>
-                <a:effectLst/>
-                <a:latin typeface="+mn-lt"/>
-                <a:ea typeface="+mn-ea"/>
-                <a:cs typeface="+mn-cs"/>
-              </a:rPr>
-              <a:t> </a:t>
-            </a:r>
-          </a:p>
-          <a:p>
-            <a:r>
-              <a:rPr lang="en-US" sz="1200" kern="1200" dirty="0" smtClean="0">
-                <a:solidFill>
-                  <a:schemeClr val="tx1"/>
-                </a:solidFill>
-                <a:effectLst/>
-                <a:latin typeface="+mn-lt"/>
-                <a:ea typeface="+mn-ea"/>
-                <a:cs typeface="+mn-cs"/>
-              </a:rPr>
-              <a:t>Using any of these templates requires nothing more than a button click. Each template comes with documentation that tells you what parameters it requires and whether the template was created by Microsoft or by someone in the community. Best of all, you can view each template’s source code, which is little more than a JSON script, and customize it to fit your needs or even build upon it to create templates of your own.</a:t>
-            </a:r>
-          </a:p>
-          <a:p>
+              <a:t>Here’s a quick look at three of the Azure VM sizes so you can see how they differ in cost and capability. One thing to keep in mind when deploying VMs is that you get charged for them whether they’re in use or not. When you’re finished using a VM or a cluster of VMs, it behooves you to go into the Azure portal and suspend each VM to avoid unnecessary charges. Once suspended, a VM is easily restarted so you can pick up where you left off and continue using it. I’ll show you how to start and stop VMs in the demo coming up shortly. I’ll also show you how to delete them so you can avoid even incurring storage charges for VMs that are no longer needed.</a:t>
+            </a:r>
             <a:endParaRPr lang="en-US" dirty="0" smtClean="0"/>
-          </a:p>
-          <a:p>
-            <a:r>
-              <a:rPr lang="en-US" dirty="0" smtClean="0"/>
-              <a:t>The three templates pictured here are just a few of the many dozens of templates currently available.</a:t>
-            </a:r>
           </a:p>
         </p:txBody>
       </p:sp>
@@ -1417,7 +1361,7 @@
     </p:spTree>
     <p:extLst>
       <p:ext uri="{BB962C8B-B14F-4D97-AF65-F5344CB8AC3E}">
-        <p14:creationId xmlns:p14="http://schemas.microsoft.com/office/powerpoint/2010/main" val="3998187520"/>
+        <p14:creationId xmlns:p14="http://schemas.microsoft.com/office/powerpoint/2010/main" val="3473641149"/>
       </p:ext>
     </p:extLst>
   </p:cSld>
@@ -1471,27 +1415,123 @@
           <a:bodyPr/>
           <a:lstStyle/>
           <a:p>
-            <a:pPr marL="0" marR="0" indent="0" algn="l" defTabSz="914400" rtl="0" eaLnBrk="1" fontAlgn="auto" latinLnBrk="0" hangingPunct="1">
-              <a:lnSpc>
-                <a:spcPct val="100000"/>
-              </a:lnSpc>
-              <a:spcBef>
-                <a:spcPts val="0"/>
-              </a:spcBef>
-              <a:spcAft>
-                <a:spcPts val="0"/>
-              </a:spcAft>
-              <a:buClrTx/>
-              <a:buSzTx/>
-              <a:buFontTx/>
-              <a:buNone/>
-              <a:tabLst/>
-              <a:defRPr/>
-            </a:pPr>
-            <a:r>
-              <a:rPr lang="en-US" dirty="0" smtClean="0"/>
-              <a:t>The Simple Linux Utility for Resource Management (SLURM), also known as the SLURM Workload Manager, is a free and open-source job scheduler for Linux that excels at distributing heavy computing workloads across clusters of machines and processors. It is used on more than half of the world's largest supercomputers and High-Performance Computing (HPC) clusters, and it enjoys widespread use in the research community for jobs that require significant CPU resources.</a:t>
-            </a:r>
+            <a:r>
+              <a:rPr lang="en-US" sz="1200" kern="1200" dirty="0" smtClean="0">
+                <a:solidFill>
+                  <a:schemeClr val="tx1"/>
+                </a:solidFill>
+                <a:effectLst/>
+                <a:latin typeface="+mn-lt"/>
+                <a:ea typeface="+mn-ea"/>
+                <a:cs typeface="+mn-cs"/>
+              </a:rPr>
+              <a:t>An important element of HPC in Azure is the Azure Resource Manager. The Azure Resource Manager is a relatively recent addition to Azure. It lets you combine the resources that comprise an application – resources such as VMs, databases, virtual networks, and storage accounts – into </a:t>
+            </a:r>
+            <a:r>
+              <a:rPr lang="en-US" sz="1200" i="1" kern="1200" dirty="0" smtClean="0">
+                <a:solidFill>
+                  <a:schemeClr val="tx1"/>
+                </a:solidFill>
+                <a:effectLst/>
+                <a:latin typeface="+mn-lt"/>
+                <a:ea typeface="+mn-ea"/>
+                <a:cs typeface="+mn-cs"/>
+              </a:rPr>
+              <a:t>resource groups</a:t>
+            </a:r>
+            <a:r>
+              <a:rPr lang="en-US" sz="1200" kern="1200" dirty="0" smtClean="0">
+                <a:solidFill>
+                  <a:schemeClr val="tx1"/>
+                </a:solidFill>
+                <a:effectLst/>
+                <a:latin typeface="+mn-lt"/>
+                <a:ea typeface="+mn-ea"/>
+                <a:cs typeface="+mn-cs"/>
+              </a:rPr>
+              <a:t> so entire applications can be deployed, managed, and even deleted with a single step. Prior to Resource Manager, resources had to be created (and deleted) one by one, which quickly became onerous with large deployments.</a:t>
+            </a:r>
+          </a:p>
+          <a:p>
+            <a:r>
+              <a:rPr lang="en-US" sz="1200" kern="1200" dirty="0" smtClean="0">
+                <a:solidFill>
+                  <a:schemeClr val="tx1"/>
+                </a:solidFill>
+                <a:effectLst/>
+                <a:latin typeface="+mn-lt"/>
+                <a:ea typeface="+mn-ea"/>
+                <a:cs typeface="+mn-cs"/>
+              </a:rPr>
+              <a:t> </a:t>
+            </a:r>
+          </a:p>
+          <a:p>
+            <a:r>
+              <a:rPr lang="en-US" sz="1200" kern="1200" dirty="0" smtClean="0">
+                <a:solidFill>
+                  <a:schemeClr val="tx1"/>
+                </a:solidFill>
+                <a:effectLst/>
+                <a:latin typeface="+mn-lt"/>
+                <a:ea typeface="+mn-ea"/>
+                <a:cs typeface="+mn-cs"/>
+              </a:rPr>
+              <a:t>The Azure Resource Manager allows you to deploy applications using declarative templates called </a:t>
+            </a:r>
+            <a:r>
+              <a:rPr lang="en-US" sz="1200" i="1" kern="1200" dirty="0" smtClean="0">
+                <a:solidFill>
+                  <a:schemeClr val="tx1"/>
+                </a:solidFill>
+                <a:effectLst/>
+                <a:latin typeface="+mn-lt"/>
+                <a:ea typeface="+mn-ea"/>
+                <a:cs typeface="+mn-cs"/>
+              </a:rPr>
+              <a:t>deployment templates</a:t>
+            </a:r>
+            <a:r>
+              <a:rPr lang="en-US" sz="1200" kern="1200" dirty="0" smtClean="0">
+                <a:solidFill>
+                  <a:schemeClr val="tx1"/>
+                </a:solidFill>
+                <a:effectLst/>
+                <a:latin typeface="+mn-lt"/>
+                <a:ea typeface="+mn-ea"/>
+                <a:cs typeface="+mn-cs"/>
+              </a:rPr>
+              <a:t>. A template contains a complete description of all the resources that make up the application. Templates can include parameters that users will be prompted to fill in each time an application is deployed. Templates can also run scripts to initialize resources to a known and consistent state.</a:t>
+            </a:r>
+          </a:p>
+          <a:p>
+            <a:r>
+              <a:rPr lang="en-US" sz="1200" kern="1200" dirty="0" smtClean="0">
+                <a:solidFill>
+                  <a:schemeClr val="tx1"/>
+                </a:solidFill>
+                <a:effectLst/>
+                <a:latin typeface="+mn-lt"/>
+                <a:ea typeface="+mn-ea"/>
+                <a:cs typeface="+mn-cs"/>
+              </a:rPr>
+              <a:t> </a:t>
+            </a:r>
+          </a:p>
+          <a:p>
+            <a:r>
+              <a:rPr lang="en-US" sz="1200" kern="1200" dirty="0" smtClean="0">
+                <a:solidFill>
+                  <a:schemeClr val="tx1"/>
+                </a:solidFill>
+                <a:effectLst/>
+                <a:latin typeface="+mn-lt"/>
+                <a:ea typeface="+mn-ea"/>
+                <a:cs typeface="+mn-cs"/>
+              </a:rPr>
+              <a:t>As an example, suppose you have built an HPC cluster that includes virtual machines and other Azure resources. With a template, you can script the creation of the entire cluster and optionally the data that goes with it. This makes it easy for others to spin up instances of the cluster, or for you to recreate it if you deleted it thinking you wouldn’t be needing it again.</a:t>
+            </a:r>
+            <a:endParaRPr lang="en-US" dirty="0" smtClean="0"/>
           </a:p>
         </p:txBody>
       </p:sp>
@@ -1521,7 +1561,187 @@
     </p:spTree>
     <p:extLst>
       <p:ext uri="{BB962C8B-B14F-4D97-AF65-F5344CB8AC3E}">
-        <p14:creationId xmlns:p14="http://schemas.microsoft.com/office/powerpoint/2010/main" val="2236143850"/>
+        <p14:creationId xmlns:p14="http://schemas.microsoft.com/office/powerpoint/2010/main" val="988917755"/>
+      </p:ext>
+    </p:extLst>
+  </p:cSld>
+  <p:clrMapOvr>
+    <a:masterClrMapping/>
+  </p:clrMapOvr>
+</p:notes>
+</file>
+
+<file path=ppt/notesSlides/notesSlide9.xml><?xml version="1.0" encoding="utf-8"?>
+<p:notes xmlns:a="http://schemas.openxmlformats.org/drawingml/2006/main" xmlns:r="http://schemas.openxmlformats.org/officeDocument/2006/relationships" xmlns:p="http://schemas.openxmlformats.org/presentationml/2006/main">
+  <p:cSld>
+    <p:spTree>
+      <p:nvGrpSpPr>
+        <p:cNvPr id="1" name=""/>
+        <p:cNvGrpSpPr/>
+        <p:nvPr/>
+      </p:nvGrpSpPr>
+      <p:grpSpPr>
+        <a:xfrm>
+          <a:off x="0" y="0"/>
+          <a:ext cx="0" cy="0"/>
+          <a:chOff x="0" y="0"/>
+          <a:chExt cx="0" cy="0"/>
+        </a:xfrm>
+      </p:grpSpPr>
+      <p:sp>
+        <p:nvSpPr>
+          <p:cNvPr id="2" name="Slide Image Placeholder 1"/>
+          <p:cNvSpPr>
+            <a:spLocks noGrp="1" noRot="1" noChangeAspect="1"/>
+          </p:cNvSpPr>
+          <p:nvPr>
+            <p:ph type="sldImg"/>
+          </p:nvPr>
+        </p:nvSpPr>
+        <p:spPr/>
+      </p:sp>
+      <p:sp>
+        <p:nvSpPr>
+          <p:cNvPr id="3" name="Notes Placeholder 2"/>
+          <p:cNvSpPr>
+            <a:spLocks noGrp="1"/>
+          </p:cNvSpPr>
+          <p:nvPr>
+            <p:ph type="body" idx="1"/>
+          </p:nvPr>
+        </p:nvSpPr>
+        <p:spPr/>
+        <p:txBody>
+          <a:bodyPr/>
+          <a:lstStyle/>
+          <a:p>
+            <a:r>
+              <a:rPr lang="en-US" sz="1200" kern="1200" dirty="0" smtClean="0">
+                <a:solidFill>
+                  <a:schemeClr val="tx1"/>
+                </a:solidFill>
+                <a:effectLst/>
+                <a:latin typeface="+mn-lt"/>
+                <a:ea typeface="+mn-ea"/>
+                <a:cs typeface="+mn-cs"/>
+              </a:rPr>
+              <a:t>You can build deployment templates of your own, or you can use ones that have already been built. An assortment of templates built by the Azure team and by others in the community can be found on the Azure </a:t>
+            </a:r>
+            <a:r>
+              <a:rPr lang="en-US" sz="1200" kern="1200" dirty="0" err="1" smtClean="0">
+                <a:solidFill>
+                  <a:schemeClr val="tx1"/>
+                </a:solidFill>
+                <a:effectLst/>
+                <a:latin typeface="+mn-lt"/>
+                <a:ea typeface="+mn-ea"/>
+                <a:cs typeface="+mn-cs"/>
+              </a:rPr>
+              <a:t>Quickstart</a:t>
+            </a:r>
+            <a:r>
+              <a:rPr lang="en-US" sz="1200" kern="1200" dirty="0" smtClean="0">
+                <a:solidFill>
+                  <a:schemeClr val="tx1"/>
+                </a:solidFill>
+                <a:effectLst/>
+                <a:latin typeface="+mn-lt"/>
+                <a:ea typeface="+mn-ea"/>
+                <a:cs typeface="+mn-cs"/>
+              </a:rPr>
+              <a:t> Templates Web site or on GitHub. There are templates for creating clusters of Linux VMs, deploying </a:t>
+            </a:r>
+            <a:r>
+              <a:rPr lang="en-US" sz="1200" kern="1200" dirty="0" err="1" smtClean="0">
+                <a:solidFill>
+                  <a:schemeClr val="tx1"/>
+                </a:solidFill>
+                <a:effectLst/>
+                <a:latin typeface="+mn-lt"/>
+                <a:ea typeface="+mn-ea"/>
+                <a:cs typeface="+mn-cs"/>
+              </a:rPr>
+              <a:t>Redis</a:t>
+            </a:r>
+            <a:r>
+              <a:rPr lang="en-US" sz="1200" kern="1200" dirty="0" smtClean="0">
+                <a:solidFill>
+                  <a:schemeClr val="tx1"/>
+                </a:solidFill>
+                <a:effectLst/>
+                <a:latin typeface="+mn-lt"/>
+                <a:ea typeface="+mn-ea"/>
+                <a:cs typeface="+mn-cs"/>
+              </a:rPr>
+              <a:t> clusters of Ubuntu VMs, deploying MySQL servers, creating Windows VMs provisioned with IIS, and a whole lot more. There is even a template that deploys Minecraft Server in an Ubuntu VM.</a:t>
+            </a:r>
+          </a:p>
+          <a:p>
+            <a:r>
+              <a:rPr lang="en-US" sz="1200" kern="1200" dirty="0" smtClean="0">
+                <a:solidFill>
+                  <a:schemeClr val="tx1"/>
+                </a:solidFill>
+                <a:effectLst/>
+                <a:latin typeface="+mn-lt"/>
+                <a:ea typeface="+mn-ea"/>
+                <a:cs typeface="+mn-cs"/>
+              </a:rPr>
+              <a:t> </a:t>
+            </a:r>
+          </a:p>
+          <a:p>
+            <a:r>
+              <a:rPr lang="en-US" sz="1200" kern="1200" dirty="0" smtClean="0">
+                <a:solidFill>
+                  <a:schemeClr val="tx1"/>
+                </a:solidFill>
+                <a:effectLst/>
+                <a:latin typeface="+mn-lt"/>
+                <a:ea typeface="+mn-ea"/>
+                <a:cs typeface="+mn-cs"/>
+              </a:rPr>
+              <a:t>Using any of these templates requires nothing more than a button click. Each template comes with documentation that tells you what parameters it requires and whether the template was created by Microsoft or by someone in the community. Best of all, you can view each template’s source code, which is little more than a JSON script, and customize it to fit your needs or even build upon it to create templates of your own.</a:t>
+            </a:r>
+          </a:p>
+          <a:p>
+            <a:endParaRPr lang="en-US" dirty="0" smtClean="0"/>
+          </a:p>
+          <a:p>
+            <a:r>
+              <a:rPr lang="en-US" dirty="0" smtClean="0"/>
+              <a:t>The three templates pictured here are just a few of the many dozens of templates currently available.</a:t>
+            </a:r>
+          </a:p>
+        </p:txBody>
+      </p:sp>
+      <p:sp>
+        <p:nvSpPr>
+          <p:cNvPr id="4" name="Slide Number Placeholder 3"/>
+          <p:cNvSpPr>
+            <a:spLocks noGrp="1"/>
+          </p:cNvSpPr>
+          <p:nvPr>
+            <p:ph type="sldNum" sz="quarter" idx="10"/>
+          </p:nvPr>
+        </p:nvSpPr>
+        <p:spPr/>
+        <p:txBody>
+          <a:bodyPr/>
+          <a:lstStyle/>
+          <a:p>
+            <a:fld id="{01283FAC-A721-45A3-BBDE-EAF2B09B7CD9}" type="slidenum">
+              <a:rPr lang="en-US" smtClean="0"/>
+              <a:t>9</a:t>
+            </a:fld>
+            <a:endParaRPr lang="en-US"/>
+          </a:p>
+        </p:txBody>
+      </p:sp>
+    </p:spTree>
+    <p:extLst>
+      <p:ext uri="{BB962C8B-B14F-4D97-AF65-F5344CB8AC3E}">
+        <p14:creationId xmlns:p14="http://schemas.microsoft.com/office/powerpoint/2010/main" val="3998187520"/>
       </p:ext>
     </p:extLst>
   </p:cSld>
@@ -1678,7 +1898,7 @@
           <a:p>
             <a:fld id="{0459C166-16D3-4A25-A2F8-C51E0E346B22}" type="datetimeFigureOut">
               <a:rPr lang="en-US" smtClean="0"/>
-              <a:t>10/10/2016</a:t>
+              <a:t>12/20/2016</a:t>
             </a:fld>
             <a:endParaRPr lang="en-US"/>
           </a:p>
@@ -1773,7 +1993,7 @@
           <a:p>
             <a:fld id="{0459C166-16D3-4A25-A2F8-C51E0E346B22}" type="datetimeFigureOut">
               <a:rPr lang="en-US" smtClean="0"/>
-              <a:t>10/10/2016</a:t>
+              <a:t>12/20/2016</a:t>
             </a:fld>
             <a:endParaRPr lang="en-US"/>
           </a:p>
@@ -2048,7 +2268,7 @@
           <a:p>
             <a:fld id="{0459C166-16D3-4A25-A2F8-C51E0E346B22}" type="datetimeFigureOut">
               <a:rPr lang="en-US" smtClean="0"/>
-              <a:t>10/10/2016</a:t>
+              <a:t>12/20/2016</a:t>
             </a:fld>
             <a:endParaRPr lang="en-US"/>
           </a:p>
@@ -2300,7 +2520,7 @@
           <a:p>
             <a:fld id="{0459C166-16D3-4A25-A2F8-C51E0E346B22}" type="datetimeFigureOut">
               <a:rPr lang="en-US" smtClean="0"/>
-              <a:t>10/10/2016</a:t>
+              <a:t>12/20/2016</a:t>
             </a:fld>
             <a:endParaRPr lang="en-US"/>
           </a:p>
@@ -2468,7 +2688,7 @@
           <a:p>
             <a:fld id="{0459C166-16D3-4A25-A2F8-C51E0E346B22}" type="datetimeFigureOut">
               <a:rPr lang="en-US" smtClean="0"/>
-              <a:t>10/10/2016</a:t>
+              <a:t>12/20/2016</a:t>
             </a:fld>
             <a:endParaRPr lang="en-US"/>
           </a:p>
@@ -2646,7 +2866,7 @@
           <a:p>
             <a:fld id="{0459C166-16D3-4A25-A2F8-C51E0E346B22}" type="datetimeFigureOut">
               <a:rPr lang="en-US" smtClean="0"/>
-              <a:t>10/10/2016</a:t>
+              <a:t>12/20/2016</a:t>
             </a:fld>
             <a:endParaRPr lang="en-US"/>
           </a:p>
@@ -4573,7 +4793,7 @@
           <a:p>
             <a:fld id="{0459C166-16D3-4A25-A2F8-C51E0E346B22}" type="datetimeFigureOut">
               <a:rPr lang="en-US" smtClean="0"/>
-              <a:t>10/10/2016</a:t>
+              <a:t>12/20/2016</a:t>
             </a:fld>
             <a:endParaRPr lang="en-US"/>
           </a:p>
@@ -10200,7 +10420,7 @@
             <a:fld id="{0459C166-16D3-4A25-A2F8-C51E0E346B22}" type="datetimeFigureOut">
               <a:rPr lang="en-US" smtClean="0"/>
               <a:pPr/>
-              <a:t>10/10/2016</a:t>
+              <a:t>12/20/2016</a:t>
             </a:fld>
             <a:endParaRPr lang="en-US"/>
           </a:p>
@@ -14262,7 +14482,7 @@
           <a:p>
             <a:fld id="{0459C166-16D3-4A25-A2F8-C51E0E346B22}" type="datetimeFigureOut">
               <a:rPr lang="en-US" smtClean="0"/>
-              <a:t>10/10/2016</a:t>
+              <a:t>12/20/2016</a:t>
             </a:fld>
             <a:endParaRPr lang="en-US"/>
           </a:p>
@@ -14626,7 +14846,7 @@
           <a:p>
             <a:fld id="{0459C166-16D3-4A25-A2F8-C51E0E346B22}" type="datetimeFigureOut">
               <a:rPr lang="en-US" smtClean="0"/>
-              <a:t>10/10/2016</a:t>
+              <a:t>12/20/2016</a:t>
             </a:fld>
             <a:endParaRPr lang="en-US"/>
           </a:p>
@@ -14743,7 +14963,7 @@
           <a:p>
             <a:fld id="{0459C166-16D3-4A25-A2F8-C51E0E346B22}" type="datetimeFigureOut">
               <a:rPr lang="en-US" smtClean="0"/>
-              <a:t>10/10/2016</a:t>
+              <a:t>12/20/2016</a:t>
             </a:fld>
             <a:endParaRPr lang="en-US"/>
           </a:p>
@@ -14954,7 +15174,7 @@
           <a:p>
             <a:fld id="{0459C166-16D3-4A25-A2F8-C51E0E346B22}" type="datetimeFigureOut">
               <a:rPr lang="en-US" smtClean="0"/>
-              <a:t>10/10/2016</a:t>
+              <a:t>12/20/2016</a:t>
             </a:fld>
             <a:endParaRPr lang="en-US"/>
           </a:p>
@@ -16314,6 +16534,178 @@
 </p:sld>
 </file>
 
+<file path=ppt/slides/slide10.xml><?xml version="1.0" encoding="utf-8"?>
+<p:sld xmlns:a="http://schemas.openxmlformats.org/drawingml/2006/main" xmlns:r="http://schemas.openxmlformats.org/officeDocument/2006/relationships" xmlns:p="http://schemas.openxmlformats.org/presentationml/2006/main">
+  <p:cSld>
+    <p:spTree>
+      <p:nvGrpSpPr>
+        <p:cNvPr id="1" name=""/>
+        <p:cNvGrpSpPr/>
+        <p:nvPr/>
+      </p:nvGrpSpPr>
+      <p:grpSpPr>
+        <a:xfrm>
+          <a:off x="0" y="0"/>
+          <a:ext cx="0" cy="0"/>
+          <a:chOff x="0" y="0"/>
+          <a:chExt cx="0" cy="0"/>
+        </a:xfrm>
+      </p:grpSpPr>
+      <p:sp>
+        <p:nvSpPr>
+          <p:cNvPr id="2" name="Title 1"/>
+          <p:cNvSpPr>
+            <a:spLocks noGrp="1"/>
+          </p:cNvSpPr>
+          <p:nvPr>
+            <p:ph type="title"/>
+          </p:nvPr>
+        </p:nvSpPr>
+        <p:spPr/>
+        <p:txBody>
+          <a:bodyPr/>
+          <a:lstStyle/>
+          <a:p>
+            <a:r>
+              <a:rPr lang="en-US" dirty="0" smtClean="0"/>
+              <a:t>SLURM Clusters</a:t>
+            </a:r>
+            <a:endParaRPr lang="en-US" dirty="0"/>
+          </a:p>
+        </p:txBody>
+      </p:sp>
+      <p:sp>
+        <p:nvSpPr>
+          <p:cNvPr id="3" name="Content Placeholder 2"/>
+          <p:cNvSpPr>
+            <a:spLocks noGrp="1"/>
+          </p:cNvSpPr>
+          <p:nvPr>
+            <p:ph idx="1"/>
+          </p:nvPr>
+        </p:nvSpPr>
+        <p:spPr/>
+        <p:txBody>
+          <a:bodyPr/>
+          <a:lstStyle/>
+          <a:p>
+            <a:r>
+              <a:rPr lang="en-US" dirty="0"/>
+              <a:t>Simple Linux Utility for Resource Management (SLURM)</a:t>
+            </a:r>
+          </a:p>
+          <a:p>
+            <a:r>
+              <a:rPr lang="en-US" dirty="0" err="1"/>
+              <a:t>Quickstart</a:t>
+            </a:r>
+            <a:r>
+              <a:rPr lang="en-US" dirty="0"/>
+              <a:t> template at </a:t>
+            </a:r>
+            <a:r>
+              <a:rPr lang="en-US" dirty="0">
+                <a:hlinkClick r:id="rId3"/>
+              </a:rPr>
+              <a:t>http://bit.ly/a4r-slurm</a:t>
+            </a:r>
+            <a:r>
+              <a:rPr lang="en-US" dirty="0"/>
+              <a:t> enables easy deployment of SLURM clusters of user-specified </a:t>
+            </a:r>
+            <a:r>
+              <a:rPr lang="en-US" dirty="0" smtClean="0"/>
+              <a:t>sizes</a:t>
+            </a:r>
+            <a:endParaRPr lang="en-US" dirty="0"/>
+          </a:p>
+        </p:txBody>
+      </p:sp>
+      <p:pic>
+        <p:nvPicPr>
+          <p:cNvPr id="4" name="Picture 3"/>
+          <p:cNvPicPr>
+            <a:picLocks noChangeAspect="1"/>
+          </p:cNvPicPr>
+          <p:nvPr/>
+        </p:nvPicPr>
+        <p:blipFill>
+          <a:blip r:embed="rId4"/>
+          <a:stretch>
+            <a:fillRect/>
+          </a:stretch>
+        </p:blipFill>
+        <p:spPr>
+          <a:xfrm>
+            <a:off x="3174205" y="3542756"/>
+            <a:ext cx="5842001" cy="2769144"/>
+          </a:xfrm>
+          <a:prstGeom prst="rect">
+            <a:avLst/>
+          </a:prstGeom>
+          <a:ln>
+            <a:solidFill>
+              <a:schemeClr val="bg1">
+                <a:lumMod val="75000"/>
+              </a:schemeClr>
+            </a:solidFill>
+          </a:ln>
+          <a:effectLst/>
+        </p:spPr>
+      </p:pic>
+    </p:spTree>
+    <p:extLst>
+      <p:ext uri="{BB962C8B-B14F-4D97-AF65-F5344CB8AC3E}">
+        <p14:creationId xmlns:p14="http://schemas.microsoft.com/office/powerpoint/2010/main" val="2739371626"/>
+      </p:ext>
+    </p:extLst>
+  </p:cSld>
+  <p:clrMapOvr>
+    <a:masterClrMapping/>
+  </p:clrMapOvr>
+</p:sld>
+</file>
+
+<file path=ppt/slides/slide11.xml><?xml version="1.0" encoding="utf-8"?>
+<p:sld xmlns:a="http://schemas.openxmlformats.org/drawingml/2006/main" xmlns:r="http://schemas.openxmlformats.org/officeDocument/2006/relationships" xmlns:p="http://schemas.openxmlformats.org/presentationml/2006/main">
+  <p:cSld>
+    <p:spTree>
+      <p:nvGrpSpPr>
+        <p:cNvPr id="1" name=""/>
+        <p:cNvGrpSpPr/>
+        <p:nvPr/>
+      </p:nvGrpSpPr>
+      <p:grpSpPr>
+        <a:xfrm>
+          <a:off x="0" y="0"/>
+          <a:ext cx="0" cy="0"/>
+          <a:chOff x="0" y="0"/>
+          <a:chExt cx="0" cy="0"/>
+        </a:xfrm>
+      </p:grpSpPr>
+    </p:spTree>
+    <p:extLst>
+      <p:ext uri="{BB962C8B-B14F-4D97-AF65-F5344CB8AC3E}">
+        <p14:creationId xmlns:p14="http://schemas.microsoft.com/office/powerpoint/2010/main" val="1570323710"/>
+      </p:ext>
+    </p:extLst>
+  </p:cSld>
+  <p:clrMapOvr>
+    <a:masterClrMapping/>
+  </p:clrMapOvr>
+  <p:transition>
+    <p:fade/>
+  </p:transition>
+  <p:timing>
+    <p:tnLst>
+      <p:par>
+        <p:cTn id="1" dur="indefinite" restart="never" nodeType="tmRoot"/>
+      </p:par>
+    </p:tnLst>
+  </p:timing>
+</p:sld>
+</file>
+
 <file path=ppt/slides/slide2.xml><?xml version="1.0" encoding="utf-8"?>
 <p:sld xmlns:a="http://schemas.openxmlformats.org/drawingml/2006/main" xmlns:r="http://schemas.openxmlformats.org/officeDocument/2006/relationships" xmlns:p="http://schemas.openxmlformats.org/presentationml/2006/main">
   <p:cSld>
@@ -16348,7 +16740,408 @@
           <a:p>
             <a:r>
               <a:rPr lang="en-US" dirty="0" smtClean="0"/>
-              <a:t>Azure HPC</a:t>
+              <a:t>High-Performance Computing</a:t>
+            </a:r>
+            <a:endParaRPr lang="en-US" dirty="0"/>
+          </a:p>
+        </p:txBody>
+      </p:sp>
+      <p:sp>
+        <p:nvSpPr>
+          <p:cNvPr id="4" name="TextBox 3"/>
+          <p:cNvSpPr txBox="1"/>
+          <p:nvPr/>
+        </p:nvSpPr>
+        <p:spPr>
+          <a:xfrm>
+            <a:off x="1806235" y="2140504"/>
+            <a:ext cx="8577943" cy="4185761"/>
+          </a:xfrm>
+          <a:prstGeom prst="rect">
+            <a:avLst/>
+          </a:prstGeom>
+          <a:noFill/>
+        </p:spPr>
+        <p:txBody>
+          <a:bodyPr wrap="square" lIns="0" tIns="0" rIns="0" bIns="0" rtlCol="0">
+            <a:spAutoFit/>
+          </a:bodyPr>
+          <a:lstStyle/>
+          <a:p>
+            <a:pPr>
+              <a:lnSpc>
+                <a:spcPct val="90000"/>
+              </a:lnSpc>
+              <a:spcBef>
+                <a:spcPct val="20000"/>
+              </a:spcBef>
+              <a:buSzPct val="80000"/>
+            </a:pPr>
+            <a:r>
+              <a:rPr lang="en-US" sz="3200" dirty="0">
+                <a:solidFill>
+                  <a:srgbClr val="5095D1"/>
+                </a:solidFill>
+              </a:rPr>
+              <a:t>“High-Performance Computing most generally refers to the practice of aggregating computing power in a way that delivers much higher performance than one could get out of a typical desktop computer or workstation in order to solve large problems in science, engineering, or business.”</a:t>
+            </a:r>
+          </a:p>
+          <a:p>
+            <a:pPr>
+              <a:lnSpc>
+                <a:spcPct val="90000"/>
+              </a:lnSpc>
+              <a:spcBef>
+                <a:spcPct val="20000"/>
+              </a:spcBef>
+              <a:buSzPct val="80000"/>
+            </a:pPr>
+            <a:r>
+              <a:rPr lang="en-US" sz="3200" dirty="0" smtClean="0">
+                <a:gradFill>
+                  <a:gsLst>
+                    <a:gs pos="0">
+                      <a:srgbClr val="292929">
+                        <a:lumMod val="90000"/>
+                        <a:lumOff val="10000"/>
+                      </a:srgbClr>
+                    </a:gs>
+                    <a:gs pos="86000">
+                      <a:srgbClr val="292929">
+                        <a:lumMod val="90000"/>
+                        <a:lumOff val="10000"/>
+                      </a:srgbClr>
+                    </a:gs>
+                  </a:gsLst>
+                  <a:lin ang="5400000" scaled="0"/>
+                </a:gradFill>
+              </a:rPr>
+              <a:t>						--</a:t>
+            </a:r>
+            <a:r>
+              <a:rPr lang="en-US" sz="3200" dirty="0">
+                <a:gradFill>
+                  <a:gsLst>
+                    <a:gs pos="0">
+                      <a:srgbClr val="292929">
+                        <a:lumMod val="90000"/>
+                        <a:lumOff val="10000"/>
+                      </a:srgbClr>
+                    </a:gs>
+                    <a:gs pos="86000">
+                      <a:srgbClr val="292929">
+                        <a:lumMod val="90000"/>
+                        <a:lumOff val="10000"/>
+                      </a:srgbClr>
+                    </a:gs>
+                  </a:gsLst>
+                  <a:lin ang="5400000" scaled="0"/>
+                </a:gradFill>
+              </a:rPr>
+              <a:t>Inside HPC</a:t>
+            </a:r>
+          </a:p>
+          <a:p>
+            <a:pPr>
+              <a:lnSpc>
+                <a:spcPct val="90000"/>
+              </a:lnSpc>
+              <a:spcBef>
+                <a:spcPct val="20000"/>
+              </a:spcBef>
+              <a:buSzPct val="80000"/>
+            </a:pPr>
+            <a:endParaRPr lang="en-US" sz="3200" dirty="0">
+              <a:gradFill>
+                <a:gsLst>
+                  <a:gs pos="0">
+                    <a:srgbClr val="292929">
+                      <a:lumMod val="90000"/>
+                      <a:lumOff val="10000"/>
+                    </a:srgbClr>
+                  </a:gs>
+                  <a:gs pos="86000">
+                    <a:srgbClr val="292929">
+                      <a:lumMod val="90000"/>
+                      <a:lumOff val="10000"/>
+                    </a:srgbClr>
+                  </a:gs>
+                </a:gsLst>
+                <a:lin ang="5400000" scaled="0"/>
+              </a:gradFill>
+            </a:endParaRPr>
+          </a:p>
+        </p:txBody>
+      </p:sp>
+    </p:spTree>
+    <p:extLst>
+      <p:ext uri="{BB962C8B-B14F-4D97-AF65-F5344CB8AC3E}">
+        <p14:creationId xmlns:p14="http://schemas.microsoft.com/office/powerpoint/2010/main" val="3188248331"/>
+      </p:ext>
+    </p:extLst>
+  </p:cSld>
+  <p:clrMapOvr>
+    <a:masterClrMapping/>
+  </p:clrMapOvr>
+</p:sld>
+</file>
+
+<file path=ppt/slides/slide3.xml><?xml version="1.0" encoding="utf-8"?>
+<p:sld xmlns:a="http://schemas.openxmlformats.org/drawingml/2006/main" xmlns:r="http://schemas.openxmlformats.org/officeDocument/2006/relationships" xmlns:p="http://schemas.openxmlformats.org/presentationml/2006/main">
+  <p:cSld>
+    <p:spTree>
+      <p:nvGrpSpPr>
+        <p:cNvPr id="1" name=""/>
+        <p:cNvGrpSpPr/>
+        <p:nvPr/>
+      </p:nvGrpSpPr>
+      <p:grpSpPr>
+        <a:xfrm>
+          <a:off x="0" y="0"/>
+          <a:ext cx="0" cy="0"/>
+          <a:chOff x="0" y="0"/>
+          <a:chExt cx="0" cy="0"/>
+        </a:xfrm>
+      </p:grpSpPr>
+      <p:sp>
+        <p:nvSpPr>
+          <p:cNvPr id="2" name="Title 1"/>
+          <p:cNvSpPr>
+            <a:spLocks noGrp="1"/>
+          </p:cNvSpPr>
+          <p:nvPr>
+            <p:ph type="title"/>
+          </p:nvPr>
+        </p:nvSpPr>
+        <p:spPr/>
+        <p:txBody>
+          <a:bodyPr/>
+          <a:lstStyle/>
+          <a:p>
+            <a:r>
+              <a:rPr lang="en-US" dirty="0" smtClean="0"/>
+              <a:t>HPC Clusters</a:t>
+            </a:r>
+            <a:endParaRPr lang="en-US" dirty="0"/>
+          </a:p>
+        </p:txBody>
+      </p:sp>
+      <p:sp>
+        <p:nvSpPr>
+          <p:cNvPr id="3" name="Content Placeholder 2"/>
+          <p:cNvSpPr>
+            <a:spLocks noGrp="1"/>
+          </p:cNvSpPr>
+          <p:nvPr>
+            <p:ph idx="1"/>
+          </p:nvPr>
+        </p:nvSpPr>
+        <p:spPr>
+          <a:xfrm>
+            <a:off x="838200" y="1825625"/>
+            <a:ext cx="6897491" cy="4351338"/>
+          </a:xfrm>
+        </p:spPr>
+        <p:txBody>
+          <a:bodyPr/>
+          <a:lstStyle/>
+          <a:p>
+            <a:pPr marL="571500" indent="-571500"/>
+            <a:r>
+              <a:rPr lang="en-US" dirty="0"/>
+              <a:t>HPC typically involves </a:t>
+            </a:r>
+            <a:r>
+              <a:rPr lang="en-US" b="1" dirty="0">
+                <a:solidFill>
+                  <a:schemeClr val="accent2"/>
+                </a:solidFill>
+              </a:rPr>
+              <a:t>clusters</a:t>
+            </a:r>
+            <a:r>
+              <a:rPr lang="en-US" dirty="0">
+                <a:solidFill>
+                  <a:schemeClr val="accent2"/>
+                </a:solidFill>
+              </a:rPr>
+              <a:t> </a:t>
+            </a:r>
+            <a:r>
+              <a:rPr lang="en-US" dirty="0"/>
+              <a:t>of computers interconnected by a high- speed network</a:t>
+            </a:r>
+          </a:p>
+          <a:p>
+            <a:pPr marL="571500" indent="-571500"/>
+            <a:r>
+              <a:rPr lang="en-US" dirty="0"/>
+              <a:t>A single computer in the cluster is called a </a:t>
+            </a:r>
+            <a:r>
+              <a:rPr lang="en-US" b="1" dirty="0">
+                <a:solidFill>
+                  <a:schemeClr val="accent2"/>
+                </a:solidFill>
+              </a:rPr>
+              <a:t>node</a:t>
+            </a:r>
+            <a:endParaRPr lang="en-US" dirty="0">
+              <a:solidFill>
+                <a:schemeClr val="accent2"/>
+              </a:solidFill>
+            </a:endParaRPr>
+          </a:p>
+          <a:p>
+            <a:pPr marL="571500" indent="-571500"/>
+            <a:r>
+              <a:rPr lang="en-US" b="1" dirty="0">
+                <a:solidFill>
+                  <a:schemeClr val="accent2"/>
+                </a:solidFill>
+              </a:rPr>
+              <a:t>Workloads</a:t>
+            </a:r>
+            <a:r>
+              <a:rPr lang="en-US" b="1" dirty="0"/>
+              <a:t> </a:t>
+            </a:r>
+            <a:r>
+              <a:rPr lang="en-US" dirty="0"/>
+              <a:t>are managed by </a:t>
+            </a:r>
+            <a:r>
+              <a:rPr lang="en-US" b="1" dirty="0">
+                <a:solidFill>
+                  <a:schemeClr val="accent2"/>
+                </a:solidFill>
+              </a:rPr>
+              <a:t>master</a:t>
+            </a:r>
+            <a:r>
+              <a:rPr lang="en-US" dirty="0">
+                <a:solidFill>
+                  <a:schemeClr val="accent2"/>
+                </a:solidFill>
+              </a:rPr>
+              <a:t> </a:t>
+            </a:r>
+            <a:r>
+              <a:rPr lang="en-US" dirty="0"/>
+              <a:t>nodes that distribute workloads across </a:t>
+            </a:r>
+            <a:r>
+              <a:rPr lang="en-US" b="1" dirty="0">
+                <a:solidFill>
+                  <a:schemeClr val="accent2"/>
+                </a:solidFill>
+              </a:rPr>
+              <a:t>worker</a:t>
+            </a:r>
+            <a:r>
+              <a:rPr lang="en-US" dirty="0">
+                <a:solidFill>
+                  <a:schemeClr val="accent2"/>
+                </a:solidFill>
+              </a:rPr>
+              <a:t> </a:t>
+            </a:r>
+            <a:r>
+              <a:rPr lang="en-US" dirty="0"/>
+              <a:t>nodes</a:t>
+            </a:r>
+            <a:endParaRPr lang="en-US" b="1" dirty="0"/>
+          </a:p>
+          <a:p>
+            <a:endParaRPr lang="en-US" dirty="0"/>
+          </a:p>
+        </p:txBody>
+      </p:sp>
+      <p:pic>
+        <p:nvPicPr>
+          <p:cNvPr id="4" name="Picture 3"/>
+          <p:cNvPicPr>
+            <a:picLocks noChangeAspect="1"/>
+          </p:cNvPicPr>
+          <p:nvPr/>
+        </p:nvPicPr>
+        <p:blipFill>
+          <a:blip r:embed="rId3">
+            <a:extLst>
+              <a:ext uri="{28A0092B-C50C-407E-A947-70E740481C1C}">
+                <a14:useLocalDpi xmlns:a14="http://schemas.microsoft.com/office/drawing/2010/main" val="0"/>
+              </a:ext>
+            </a:extLst>
+          </a:blip>
+          <a:stretch>
+            <a:fillRect/>
+          </a:stretch>
+        </p:blipFill>
+        <p:spPr>
+          <a:xfrm>
+            <a:off x="8216008" y="976500"/>
+            <a:ext cx="2657475" cy="4886325"/>
+          </a:xfrm>
+          <a:prstGeom prst="rect">
+            <a:avLst/>
+          </a:prstGeom>
+          <a:ln>
+            <a:solidFill>
+              <a:schemeClr val="bg1">
+                <a:lumMod val="75000"/>
+              </a:schemeClr>
+            </a:solidFill>
+          </a:ln>
+        </p:spPr>
+      </p:pic>
+    </p:spTree>
+    <p:extLst>
+      <p:ext uri="{BB962C8B-B14F-4D97-AF65-F5344CB8AC3E}">
+        <p14:creationId xmlns:p14="http://schemas.microsoft.com/office/powerpoint/2010/main" val="1769374902"/>
+      </p:ext>
+    </p:extLst>
+  </p:cSld>
+  <p:clrMapOvr>
+    <a:masterClrMapping/>
+  </p:clrMapOvr>
+</p:sld>
+</file>
+
+<file path=ppt/slides/slide4.xml><?xml version="1.0" encoding="utf-8"?>
+<p:sld xmlns:a="http://schemas.openxmlformats.org/drawingml/2006/main" xmlns:r="http://schemas.openxmlformats.org/officeDocument/2006/relationships" xmlns:p="http://schemas.openxmlformats.org/presentationml/2006/main">
+  <p:cSld>
+    <p:spTree>
+      <p:nvGrpSpPr>
+        <p:cNvPr id="1" name=""/>
+        <p:cNvGrpSpPr/>
+        <p:nvPr/>
+      </p:nvGrpSpPr>
+      <p:grpSpPr>
+        <a:xfrm>
+          <a:off x="0" y="0"/>
+          <a:ext cx="0" cy="0"/>
+          <a:chOff x="0" y="0"/>
+          <a:chExt cx="0" cy="0"/>
+        </a:xfrm>
+      </p:grpSpPr>
+      <p:sp>
+        <p:nvSpPr>
+          <p:cNvPr id="2" name="Title 1"/>
+          <p:cNvSpPr>
+            <a:spLocks noGrp="1"/>
+          </p:cNvSpPr>
+          <p:nvPr>
+            <p:ph type="title"/>
+          </p:nvPr>
+        </p:nvSpPr>
+        <p:spPr/>
+        <p:txBody>
+          <a:bodyPr/>
+          <a:lstStyle/>
+          <a:p>
+            <a:r>
+              <a:rPr lang="en-US" dirty="0" smtClean="0"/>
+              <a:t>HPC in Azure</a:t>
             </a:r>
             <a:endParaRPr lang="en-US" dirty="0"/>
           </a:p>
@@ -16457,7 +17250,7 @@
 </p:sld>
 </file>
 
-<file path=ppt/slides/slide3.xml><?xml version="1.0" encoding="utf-8"?>
+<file path=ppt/slides/slide5.xml><?xml version="1.0" encoding="utf-8"?>
 <p:sld xmlns:a="http://schemas.openxmlformats.org/drawingml/2006/main" xmlns:r="http://schemas.openxmlformats.org/officeDocument/2006/relationships" xmlns:p="http://schemas.openxmlformats.org/presentationml/2006/main">
   <p:cSld>
     <p:spTree>
@@ -21200,7 +21993,7 @@
 </p:sld>
 </file>
 
-<file path=ppt/slides/slide4.xml><?xml version="1.0" encoding="utf-8"?>
+<file path=ppt/slides/slide6.xml><?xml version="1.0" encoding="utf-8"?>
 <p:sld xmlns:a="http://schemas.openxmlformats.org/drawingml/2006/main" xmlns:r="http://schemas.openxmlformats.org/officeDocument/2006/relationships" xmlns:p="http://schemas.openxmlformats.org/presentationml/2006/main">
   <p:cSld>
     <p:spTree>
@@ -22786,7 +23579,7 @@
 </p:sld>
 </file>
 
-<file path=ppt/slides/slide5.xml><?xml version="1.0" encoding="utf-8"?>
+<file path=ppt/slides/slide7.xml><?xml version="1.0" encoding="utf-8"?>
 <p:sld xmlns:a="http://schemas.openxmlformats.org/drawingml/2006/main" xmlns:r="http://schemas.openxmlformats.org/officeDocument/2006/relationships" xmlns:p="http://schemas.openxmlformats.org/presentationml/2006/main">
   <p:cSld>
     <p:spTree>
@@ -24192,7 +24985,7 @@
 </p:sld>
 </file>
 
-<file path=ppt/slides/slide6.xml><?xml version="1.0" encoding="utf-8"?>
+<file path=ppt/slides/slide8.xml><?xml version="1.0" encoding="utf-8"?>
 <p:sld xmlns:a="http://schemas.openxmlformats.org/drawingml/2006/main" xmlns:r="http://schemas.openxmlformats.org/officeDocument/2006/relationships" xmlns:p="http://schemas.openxmlformats.org/presentationml/2006/main">
   <p:cSld>
     <p:spTree>
@@ -24322,7 +25115,7 @@
 </p:sld>
 </file>
 
-<file path=ppt/slides/slide7.xml><?xml version="1.0" encoding="utf-8"?>
+<file path=ppt/slides/slide9.xml><?xml version="1.0" encoding="utf-8"?>
 <p:sld xmlns:a="http://schemas.openxmlformats.org/drawingml/2006/main" xmlns:r="http://schemas.openxmlformats.org/officeDocument/2006/relationships" xmlns:p="http://schemas.openxmlformats.org/presentationml/2006/main">
   <p:cSld>
     <p:spTree>
@@ -24548,178 +25341,6 @@
   <p:clrMapOvr>
     <a:masterClrMapping/>
   </p:clrMapOvr>
-</p:sld>
-</file>
-
-<file path=ppt/slides/slide8.xml><?xml version="1.0" encoding="utf-8"?>
-<p:sld xmlns:a="http://schemas.openxmlformats.org/drawingml/2006/main" xmlns:r="http://schemas.openxmlformats.org/officeDocument/2006/relationships" xmlns:p="http://schemas.openxmlformats.org/presentationml/2006/main">
-  <p:cSld>
-    <p:spTree>
-      <p:nvGrpSpPr>
-        <p:cNvPr id="1" name=""/>
-        <p:cNvGrpSpPr/>
-        <p:nvPr/>
-      </p:nvGrpSpPr>
-      <p:grpSpPr>
-        <a:xfrm>
-          <a:off x="0" y="0"/>
-          <a:ext cx="0" cy="0"/>
-          <a:chOff x="0" y="0"/>
-          <a:chExt cx="0" cy="0"/>
-        </a:xfrm>
-      </p:grpSpPr>
-      <p:sp>
-        <p:nvSpPr>
-          <p:cNvPr id="2" name="Title 1"/>
-          <p:cNvSpPr>
-            <a:spLocks noGrp="1"/>
-          </p:cNvSpPr>
-          <p:nvPr>
-            <p:ph type="title"/>
-          </p:nvPr>
-        </p:nvSpPr>
-        <p:spPr/>
-        <p:txBody>
-          <a:bodyPr/>
-          <a:lstStyle/>
-          <a:p>
-            <a:r>
-              <a:rPr lang="en-US" dirty="0" smtClean="0"/>
-              <a:t>SLURM Clusters</a:t>
-            </a:r>
-            <a:endParaRPr lang="en-US" dirty="0"/>
-          </a:p>
-        </p:txBody>
-      </p:sp>
-      <p:sp>
-        <p:nvSpPr>
-          <p:cNvPr id="3" name="Content Placeholder 2"/>
-          <p:cNvSpPr>
-            <a:spLocks noGrp="1"/>
-          </p:cNvSpPr>
-          <p:nvPr>
-            <p:ph idx="1"/>
-          </p:nvPr>
-        </p:nvSpPr>
-        <p:spPr/>
-        <p:txBody>
-          <a:bodyPr/>
-          <a:lstStyle/>
-          <a:p>
-            <a:r>
-              <a:rPr lang="en-US" dirty="0"/>
-              <a:t>Simple Linux Utility for Resource Management (SLURM)</a:t>
-            </a:r>
-          </a:p>
-          <a:p>
-            <a:r>
-              <a:rPr lang="en-US" dirty="0" err="1"/>
-              <a:t>Quickstart</a:t>
-            </a:r>
-            <a:r>
-              <a:rPr lang="en-US" dirty="0"/>
-              <a:t> template at </a:t>
-            </a:r>
-            <a:r>
-              <a:rPr lang="en-US" dirty="0">
-                <a:hlinkClick r:id="rId3"/>
-              </a:rPr>
-              <a:t>http://bit.ly/a4r-slurm</a:t>
-            </a:r>
-            <a:r>
-              <a:rPr lang="en-US" dirty="0"/>
-              <a:t> enables easy deployment of SLURM clusters of user-specified </a:t>
-            </a:r>
-            <a:r>
-              <a:rPr lang="en-US" dirty="0" smtClean="0"/>
-              <a:t>sizes</a:t>
-            </a:r>
-            <a:endParaRPr lang="en-US" dirty="0"/>
-          </a:p>
-        </p:txBody>
-      </p:sp>
-      <p:pic>
-        <p:nvPicPr>
-          <p:cNvPr id="4" name="Picture 3"/>
-          <p:cNvPicPr>
-            <a:picLocks noChangeAspect="1"/>
-          </p:cNvPicPr>
-          <p:nvPr/>
-        </p:nvPicPr>
-        <p:blipFill>
-          <a:blip r:embed="rId4"/>
-          <a:stretch>
-            <a:fillRect/>
-          </a:stretch>
-        </p:blipFill>
-        <p:spPr>
-          <a:xfrm>
-            <a:off x="3174205" y="3542756"/>
-            <a:ext cx="5842001" cy="2769144"/>
-          </a:xfrm>
-          <a:prstGeom prst="rect">
-            <a:avLst/>
-          </a:prstGeom>
-          <a:ln>
-            <a:solidFill>
-              <a:schemeClr val="bg1">
-                <a:lumMod val="75000"/>
-              </a:schemeClr>
-            </a:solidFill>
-          </a:ln>
-          <a:effectLst/>
-        </p:spPr>
-      </p:pic>
-    </p:spTree>
-    <p:extLst>
-      <p:ext uri="{BB962C8B-B14F-4D97-AF65-F5344CB8AC3E}">
-        <p14:creationId xmlns:p14="http://schemas.microsoft.com/office/powerpoint/2010/main" val="2739371626"/>
-      </p:ext>
-    </p:extLst>
-  </p:cSld>
-  <p:clrMapOvr>
-    <a:masterClrMapping/>
-  </p:clrMapOvr>
-</p:sld>
-</file>
-
-<file path=ppt/slides/slide9.xml><?xml version="1.0" encoding="utf-8"?>
-<p:sld xmlns:a="http://schemas.openxmlformats.org/drawingml/2006/main" xmlns:r="http://schemas.openxmlformats.org/officeDocument/2006/relationships" xmlns:p="http://schemas.openxmlformats.org/presentationml/2006/main">
-  <p:cSld>
-    <p:spTree>
-      <p:nvGrpSpPr>
-        <p:cNvPr id="1" name=""/>
-        <p:cNvGrpSpPr/>
-        <p:nvPr/>
-      </p:nvGrpSpPr>
-      <p:grpSpPr>
-        <a:xfrm>
-          <a:off x="0" y="0"/>
-          <a:ext cx="0" cy="0"/>
-          <a:chOff x="0" y="0"/>
-          <a:chExt cx="0" cy="0"/>
-        </a:xfrm>
-      </p:grpSpPr>
-    </p:spTree>
-    <p:extLst>
-      <p:ext uri="{BB962C8B-B14F-4D97-AF65-F5344CB8AC3E}">
-        <p14:creationId xmlns:p14="http://schemas.microsoft.com/office/powerpoint/2010/main" val="1570323710"/>
-      </p:ext>
-    </p:extLst>
-  </p:cSld>
-  <p:clrMapOvr>
-    <a:masterClrMapping/>
-  </p:clrMapOvr>
-  <p:transition>
-    <p:fade/>
-  </p:transition>
-  <p:timing>
-    <p:tnLst>
-      <p:par>
-        <p:cTn id="1" dur="indefinite" restart="never" nodeType="tmRoot"/>
-      </p:par>
-    </p:tnLst>
-  </p:timing>
 </p:sld>
 </file>
 

</xml_diff>